<commit_message>
Updated presentation sprint 1
</commit_message>
<xml_diff>
--- a/EdaWorkshop.pptx
+++ b/EdaWorkshop.pptx
@@ -4294,19 +4294,7 @@
             <a:pPr lvl="1"/>
             <a:r>
               <a:rPr lang="en-US" dirty="0" smtClean="0"/>
-              <a:t>Components can be added/removed dynamically (in </a:t>
-            </a:r>
-            <a:r>
-              <a:rPr lang="en-US" dirty="0" smtClean="0"/>
-              <a:t>minute</a:t>
-            </a:r>
-            <a:r>
-              <a:rPr lang="en-US" dirty="0" smtClean="0"/>
-              <a:t>s</a:t>
-            </a:r>
-            <a:r>
-              <a:rPr lang="en-US" dirty="0" smtClean="0"/>
-              <a:t>) based on load</a:t>
+              <a:t>Components can be added/removed dynamically (in minutes) based on load</a:t>
             </a:r>
           </a:p>
           <a:p>
@@ -6019,7 +6007,6 @@
               <a:rPr lang="en-US" sz="900" dirty="0"/>
               <a:t>Request Decided</a:t>
             </a:r>
-            <a:endParaRPr lang="en-US" sz="900" dirty="0"/>
           </a:p>
         </p:txBody>
       </p:sp>
@@ -6424,11 +6411,7 @@
             <a:pPr algn="ctr"/>
             <a:r>
               <a:rPr lang="en-US" dirty="0" smtClean="0"/>
-              <a:t>Routing </a:t>
-            </a:r>
-            <a:r>
-              <a:rPr lang="en-US" dirty="0" smtClean="0"/>
-              <a:t>Service</a:t>
+              <a:t>Routing Service</a:t>
             </a:r>
             <a:endParaRPr lang="en-US" dirty="0"/>
           </a:p>
@@ -6622,7 +6605,6 @@
               <a:rPr lang="en-US" sz="900" dirty="0"/>
               <a:t>Request Decided</a:t>
             </a:r>
-            <a:endParaRPr lang="en-US" sz="900" dirty="0"/>
           </a:p>
         </p:txBody>
       </p:sp>
@@ -7161,11 +7143,7 @@
             <a:pPr algn="ctr"/>
             <a:r>
               <a:rPr lang="en-US" dirty="0" smtClean="0"/>
-              <a:t>Routing </a:t>
-            </a:r>
-            <a:r>
-              <a:rPr lang="en-US" dirty="0" smtClean="0"/>
-              <a:t>Service</a:t>
+              <a:t>Routing Service</a:t>
             </a:r>
             <a:endParaRPr lang="en-US" dirty="0"/>
           </a:p>
@@ -7403,7 +7381,6 @@
               <a:rPr lang="en-US" sz="900" dirty="0"/>
               <a:t>Request Decided</a:t>
             </a:r>
-            <a:endParaRPr lang="en-US" sz="900" dirty="0"/>
           </a:p>
         </p:txBody>
       </p:sp>
@@ -8110,11 +8087,7 @@
             <a:pPr algn="ctr"/>
             <a:r>
               <a:rPr lang="en-US" dirty="0" smtClean="0"/>
-              <a:t>Routing </a:t>
-            </a:r>
-            <a:r>
-              <a:rPr lang="en-US" dirty="0" smtClean="0"/>
-              <a:t>Service</a:t>
+              <a:t>Routing Service</a:t>
             </a:r>
             <a:endParaRPr lang="en-US" dirty="0"/>
           </a:p>
@@ -8352,7 +8325,6 @@
               <a:rPr lang="en-US" sz="900" dirty="0"/>
               <a:t>Request Decided</a:t>
             </a:r>
-            <a:endParaRPr lang="en-US" sz="900" dirty="0"/>
           </a:p>
         </p:txBody>
       </p:sp>
@@ -9174,11 +9146,7 @@
             <a:pPr algn="ctr"/>
             <a:r>
               <a:rPr lang="en-US" dirty="0" smtClean="0"/>
-              <a:t>Routing </a:t>
-            </a:r>
-            <a:r>
-              <a:rPr lang="en-US" dirty="0" smtClean="0"/>
-              <a:t>Service</a:t>
+              <a:t>Routing Service</a:t>
             </a:r>
             <a:endParaRPr lang="en-US" dirty="0"/>
           </a:p>
@@ -9416,7 +9384,6 @@
               <a:rPr lang="en-US" sz="900" dirty="0"/>
               <a:t>Request Decided</a:t>
             </a:r>
-            <a:endParaRPr lang="en-US" sz="900" dirty="0"/>
           </a:p>
         </p:txBody>
       </p:sp>
@@ -10360,36 +10327,20 @@
             </a:r>
             <a:r>
               <a:rPr lang="en-US" dirty="0"/>
-              <a:t>incoming requests to message bus </a:t>
+              <a:t>incoming requests to </a:t>
+            </a:r>
+            <a:r>
+              <a:rPr lang="en-US" dirty="0" smtClean="0"/>
+              <a:t>utilization management platform</a:t>
+            </a:r>
+            <a:r>
+              <a:rPr lang="en-US" dirty="0" smtClean="0"/>
+              <a:t> </a:t>
             </a:r>
             <a:endParaRPr lang="en-US" b="1" dirty="0"/>
           </a:p>
         </p:txBody>
       </p:sp>
-      <p:pic>
-        <p:nvPicPr>
-          <p:cNvPr id="6" name="Picture 5"/>
-          <p:cNvPicPr>
-            <a:picLocks noChangeAspect="1"/>
-          </p:cNvPicPr>
-          <p:nvPr/>
-        </p:nvPicPr>
-        <p:blipFill>
-          <a:blip r:embed="rId2"/>
-          <a:stretch>
-            <a:fillRect/>
-          </a:stretch>
-        </p:blipFill>
-        <p:spPr>
-          <a:xfrm>
-            <a:off x="7752588" y="3228703"/>
-            <a:ext cx="3695700" cy="1219200"/>
-          </a:xfrm>
-          <a:prstGeom prst="rect">
-            <a:avLst/>
-          </a:prstGeom>
-        </p:spPr>
-      </p:pic>
     </p:spTree>
     <p:extLst>
       <p:ext uri="{BB962C8B-B14F-4D97-AF65-F5344CB8AC3E}">
@@ -10455,7 +10406,9 @@
         </p:nvSpPr>
         <p:spPr/>
         <p:txBody>
-          <a:bodyPr anchor="ctr"/>
+          <a:bodyPr anchor="t">
+            <a:normAutofit fontScale="77500" lnSpcReduction="20000"/>
+          </a:bodyPr>
           <a:lstStyle/>
           <a:p>
             <a:pPr marL="0" indent="0">
@@ -10463,23 +10416,124 @@
             </a:pPr>
             <a:r>
               <a:rPr lang="en-US" dirty="0" smtClean="0"/>
-              <a:t>As a TAH developer, I </a:t>
-            </a:r>
-            <a:r>
-              <a:rPr lang="en-US" dirty="0" smtClean="0"/>
-              <a:t>need all incoming requests </a:t>
-            </a:r>
-            <a:r>
-              <a:rPr lang="en-US" dirty="0" smtClean="0"/>
-              <a:t>for </a:t>
-            </a:r>
-            <a:r>
-              <a:rPr lang="en-US" dirty="0" smtClean="0"/>
-              <a:t>service to be available to all current and future components of the utilization management platform </a:t>
-            </a:r>
-            <a:r>
-              <a:rPr lang="en-US" dirty="0" smtClean="0"/>
-              <a:t>so that I can implement the features provided by TAH.</a:t>
+              <a:t>As a TAH developer, I need all incoming requests for service to be available to all current and future components of the utilization management platform so that I can implement the features provided by TAH</a:t>
+            </a:r>
+            <a:r>
+              <a:rPr lang="en-US" dirty="0" smtClean="0"/>
+              <a:t>.</a:t>
+            </a:r>
+          </a:p>
+          <a:p>
+            <a:pPr marL="0" indent="0">
+              <a:buNone/>
+            </a:pPr>
+            <a:endParaRPr lang="en-US" dirty="0"/>
+          </a:p>
+          <a:p>
+            <a:pPr marL="0" indent="0">
+              <a:buNone/>
+            </a:pPr>
+            <a:r>
+              <a:rPr lang="en-US" dirty="0" smtClean="0"/>
+              <a:t>Acceptance Criteria</a:t>
+            </a:r>
+          </a:p>
+          <a:p>
+            <a:pPr marL="457200" indent="-457200">
+              <a:buFont typeface="+mj-lt"/>
+              <a:buAutoNum type="arabicPeriod"/>
+            </a:pPr>
+            <a:r>
+              <a:rPr lang="en-US" dirty="0" smtClean="0"/>
+              <a:t>Requests are available to current and future services within 10 seconds of arriving on the network</a:t>
+            </a:r>
+          </a:p>
+          <a:p>
+            <a:pPr marL="457200" indent="-457200">
+              <a:buFont typeface="+mj-lt"/>
+              <a:buAutoNum type="arabicPeriod"/>
+            </a:pPr>
+            <a:r>
+              <a:rPr lang="en-US" dirty="0" smtClean="0"/>
+              <a:t>Consumers must be able to </a:t>
+            </a:r>
+            <a:r>
+              <a:rPr lang="en-US" dirty="0"/>
+              <a:t>receive the requests in the order they were received</a:t>
+            </a:r>
+          </a:p>
+          <a:p>
+            <a:pPr marL="457200" indent="-457200">
+              <a:buFont typeface="+mj-lt"/>
+              <a:buAutoNum type="arabicPeriod"/>
+            </a:pPr>
+            <a:r>
+              <a:rPr lang="en-US" dirty="0" smtClean="0"/>
+              <a:t>Consumers should be able to </a:t>
+            </a:r>
+          </a:p>
+          <a:p>
+            <a:pPr marL="731520" lvl="1" indent="-457200">
+              <a:buFont typeface="+mj-lt"/>
+              <a:buAutoNum type="alphaLcPeriod"/>
+            </a:pPr>
+            <a:r>
+              <a:rPr lang="en-US" dirty="0" smtClean="0"/>
+              <a:t>receive requests asynchronously</a:t>
+            </a:r>
+          </a:p>
+          <a:p>
+            <a:pPr marL="731520" lvl="1" indent="-457200">
+              <a:buFont typeface="+mj-lt"/>
+              <a:buAutoNum type="alphaLcPeriod"/>
+            </a:pPr>
+            <a:r>
+              <a:rPr lang="en-US" dirty="0" smtClean="0"/>
+              <a:t>replay previously received requests</a:t>
+            </a:r>
+          </a:p>
+          <a:p>
+            <a:pPr marL="457200" indent="-457200">
+              <a:buFont typeface="+mj-lt"/>
+              <a:buAutoNum type="arabicPeriod"/>
+            </a:pPr>
+            <a:r>
+              <a:rPr lang="en-US" dirty="0"/>
+              <a:t>System must be able to receive up to 10,000 incoming requests per </a:t>
+            </a:r>
+            <a:r>
+              <a:rPr lang="en-US" dirty="0" smtClean="0"/>
+              <a:t>minute</a:t>
+            </a:r>
+            <a:endParaRPr lang="en-US" dirty="0" smtClean="0"/>
+          </a:p>
+          <a:p>
+            <a:pPr marL="0" indent="0">
+              <a:buNone/>
+            </a:pPr>
+            <a:endParaRPr lang="en-US" dirty="0"/>
+          </a:p>
+          <a:p>
+            <a:pPr marL="0" indent="0">
+              <a:buNone/>
+            </a:pPr>
+            <a:r>
+              <a:rPr lang="en-US" dirty="0" smtClean="0"/>
+              <a:t>Implementation Notes</a:t>
+            </a:r>
+          </a:p>
+          <a:p>
+            <a:r>
+              <a:rPr lang="en-US" dirty="0" smtClean="0"/>
+              <a:t>We’ll simulate </a:t>
+            </a:r>
+            <a:r>
+              <a:rPr lang="en-US" dirty="0" smtClean="0"/>
+              <a:t>receiv</a:t>
+            </a:r>
+            <a:r>
+              <a:rPr lang="en-US" dirty="0" smtClean="0"/>
+              <a:t>ing requests by generating random requests</a:t>
             </a:r>
             <a:endParaRPr lang="en-US" dirty="0"/>
           </a:p>
@@ -10769,11 +10823,7 @@
             <a:pPr algn="ctr"/>
             <a:r>
               <a:rPr lang="en-US" dirty="0" smtClean="0"/>
-              <a:t>Routing </a:t>
-            </a:r>
-            <a:r>
-              <a:rPr lang="en-US" dirty="0" smtClean="0"/>
-              <a:t>Service</a:t>
+              <a:t>Routing Service</a:t>
             </a:r>
             <a:endParaRPr lang="en-US" dirty="0"/>
           </a:p>
@@ -11048,15 +11098,7 @@
             <a:pPr algn="ctr"/>
             <a:r>
               <a:rPr lang="en-US" sz="900" dirty="0" smtClean="0"/>
-              <a:t>Request </a:t>
-            </a:r>
-            <a:r>
-              <a:rPr lang="en-US" sz="900" dirty="0" smtClean="0"/>
-              <a:t>Decide</a:t>
-            </a:r>
-            <a:r>
-              <a:rPr lang="en-US" sz="900" dirty="0" smtClean="0"/>
-              <a:t>d</a:t>
+              <a:t>Request Decided</a:t>
             </a:r>
             <a:endParaRPr lang="en-US" sz="900" dirty="0"/>
           </a:p>
@@ -12154,19 +12196,13 @@
               <a:rPr lang="en-US" dirty="0" smtClean="0"/>
               <a:t>Namespace (i.e. cluster)</a:t>
             </a:r>
-            <a:endParaRPr lang="en-US" dirty="0" smtClean="0"/>
           </a:p>
           <a:p>
             <a:pPr lvl="1"/>
             <a:r>
               <a:rPr lang="en-US" dirty="0" smtClean="0"/>
-              <a:t>Hub (i.e. </a:t>
-            </a:r>
-            <a:r>
-              <a:rPr lang="en-US" dirty="0" smtClean="0"/>
-              <a:t>topic)</a:t>
-            </a:r>
-            <a:endParaRPr lang="en-US" dirty="0" smtClean="0"/>
+              <a:t>Hub (i.e. topic)</a:t>
+            </a:r>
           </a:p>
           <a:p>
             <a:pPr lvl="1"/>
@@ -12282,13 +12318,17 @@
         <p:spPr/>
         <p:txBody>
           <a:bodyPr>
-            <a:normAutofit fontScale="77500" lnSpcReduction="20000"/>
+            <a:normAutofit fontScale="70000" lnSpcReduction="20000"/>
           </a:bodyPr>
           <a:lstStyle/>
           <a:p>
             <a:r>
               <a:rPr lang="en-US" dirty="0" smtClean="0"/>
-              <a:t>Azure’s event-driven </a:t>
+              <a:t>Azure’s </a:t>
+            </a:r>
+            <a:r>
+              <a:rPr lang="en-US" dirty="0" smtClean="0"/>
+              <a:t>event-driven, </a:t>
             </a:r>
             <a:r>
               <a:rPr lang="en-US" dirty="0" err="1" smtClean="0"/>
@@ -12296,11 +12336,7 @@
             </a:r>
             <a:r>
               <a:rPr lang="en-US" dirty="0" smtClean="0"/>
-              <a:t> compute </a:t>
-            </a:r>
-            <a:r>
-              <a:rPr lang="en-US" dirty="0" smtClean="0"/>
-              <a:t>option</a:t>
+              <a:t> compute option</a:t>
             </a:r>
           </a:p>
           <a:p>
@@ -12339,15 +12375,32 @@
             <a:pPr lvl="1"/>
             <a:r>
               <a:rPr lang="en-US" dirty="0" smtClean="0"/>
-              <a:t>Message arrived / event occurred</a:t>
+              <a:t>Message arrived / event </a:t>
+            </a:r>
+            <a:r>
+              <a:rPr lang="en-US" dirty="0" smtClean="0"/>
+              <a:t>occurred</a:t>
             </a:r>
           </a:p>
           <a:p>
             <a:pPr lvl="1"/>
             <a:r>
               <a:rPr lang="en-US" dirty="0" smtClean="0"/>
-              <a:t>BLOB created / updated</a:t>
-            </a:r>
+              <a:t>Database record created, updated, or deleted</a:t>
+            </a:r>
+            <a:endParaRPr lang="en-US" dirty="0" smtClean="0"/>
+          </a:p>
+          <a:p>
+            <a:pPr lvl="1"/>
+            <a:r>
+              <a:rPr lang="en-US" dirty="0" smtClean="0"/>
+              <a:t>BLOB </a:t>
+            </a:r>
+            <a:r>
+              <a:rPr lang="en-US" dirty="0" smtClean="0"/>
+              <a:t>created, updated, or deleted</a:t>
+            </a:r>
+            <a:endParaRPr lang="en-US" dirty="0" smtClean="0"/>
           </a:p>
           <a:p>
             <a:endParaRPr lang="en-US" dirty="0"/>
@@ -12380,13 +12433,8 @@
           <a:p>
             <a:r>
               <a:rPr lang="en-US" dirty="0" smtClean="0"/>
-              <a:t>Key </a:t>
-            </a:r>
-            <a:r>
-              <a:rPr lang="en-US" dirty="0" smtClean="0"/>
-              <a:t>terms</a:t>
-            </a:r>
-            <a:endParaRPr lang="en-US" dirty="0" smtClean="0"/>
+              <a:t>Key terms</a:t>
+            </a:r>
           </a:p>
         </p:txBody>
       </p:sp>
@@ -12464,19 +12512,14 @@
               <a:rPr lang="en-US" dirty="0" smtClean="0"/>
               <a:t>Develop in Azure Portal</a:t>
             </a:r>
-            <a:endParaRPr lang="en-US" dirty="0" smtClean="0"/>
-          </a:p>
-          <a:p>
-            <a:endParaRPr lang="en-US" dirty="0"/>
-          </a:p>
-          <a:p>
-            <a:r>
-              <a:rPr lang="en-US" dirty="0" smtClean="0"/>
-              <a:t>Create Azure Hub </a:t>
-            </a:r>
-            <a:r>
-              <a:rPr lang="en-US" dirty="0" smtClean="0"/>
-              <a:t>Namespace</a:t>
+          </a:p>
+          <a:p>
+            <a:endParaRPr lang="en-US" dirty="0"/>
+          </a:p>
+          <a:p>
+            <a:r>
+              <a:rPr lang="en-US" dirty="0" smtClean="0"/>
+              <a:t>Create Azure Hub Namespace</a:t>
             </a:r>
           </a:p>
           <a:p>
@@ -12503,23 +12546,17 @@
           <a:p>
             <a:r>
               <a:rPr lang="en-US" dirty="0" smtClean="0"/>
-              <a:t>Create Azure </a:t>
-            </a:r>
-            <a:r>
-              <a:rPr lang="en-US" dirty="0" smtClean="0"/>
-              <a:t>Hub for received requests</a:t>
-            </a:r>
+              <a:t>Create Azure Hub for received requests</a:t>
+            </a:r>
+          </a:p>
+          <a:p>
             <a:endParaRPr lang="en-US" dirty="0" smtClean="0"/>
           </a:p>
           <a:p>
-            <a:endParaRPr lang="en-US" dirty="0" smtClean="0"/>
-          </a:p>
-          <a:p>
             <a:r>
               <a:rPr lang="en-US" dirty="0" smtClean="0"/>
               <a:t>Create Shared Access Policy for publisher</a:t>
             </a:r>
-            <a:endParaRPr lang="en-US" dirty="0" smtClean="0"/>
           </a:p>
         </p:txBody>
       </p:sp>
@@ -12589,13 +12626,26 @@
         <p:spPr/>
         <p:txBody>
           <a:bodyPr>
-            <a:normAutofit lnSpcReduction="10000"/>
+            <a:normAutofit fontScale="92500" lnSpcReduction="20000"/>
           </a:bodyPr>
           <a:lstStyle/>
           <a:p>
             <a:r>
               <a:rPr lang="en-US" dirty="0" smtClean="0"/>
-              <a:t>Start with ThreeAmigosHealth.sln in Sprint1/Initial</a:t>
+              <a:t>Simulate incoming requests by generating and sending randomly requests</a:t>
+            </a:r>
+          </a:p>
+          <a:p>
+            <a:endParaRPr lang="en-US" dirty="0"/>
+          </a:p>
+          <a:p>
+            <a:r>
+              <a:rPr lang="en-US" dirty="0" smtClean="0"/>
+              <a:t>Start </a:t>
+            </a:r>
+            <a:r>
+              <a:rPr lang="en-US" dirty="0" smtClean="0"/>
+              <a:t>with ThreeAmigosHealth.sln in Sprint1/Initial</a:t>
             </a:r>
           </a:p>
           <a:p>
@@ -12616,17 +12666,68 @@
             </a:r>
             <a:r>
               <a:rPr lang="en-US" dirty="0" smtClean="0"/>
-              <a:t>with Event Hub Trigger</a:t>
+              <a:t>with </a:t>
+            </a:r>
+            <a:r>
+              <a:rPr lang="en-US" dirty="0" smtClean="0"/>
+              <a:t>Timer Trigger</a:t>
             </a:r>
             <a:endParaRPr lang="en-US" dirty="0" smtClean="0"/>
           </a:p>
           <a:p>
-            <a:endParaRPr lang="en-US" dirty="0" smtClean="0"/>
-          </a:p>
-          <a:p>
-            <a:r>
-              <a:rPr lang="en-US" dirty="0" smtClean="0"/>
-              <a:t>Business logic in </a:t>
+            <a:pPr lvl="1"/>
+            <a:r>
+              <a:rPr lang="en-US" dirty="0" smtClean="0"/>
+              <a:t>Timer will send 1 or more requests each time it fires</a:t>
+            </a:r>
+          </a:p>
+          <a:p>
+            <a:pPr lvl="1"/>
+            <a:r>
+              <a:rPr lang="en-US" dirty="0" smtClean="0"/>
+              <a:t>Use </a:t>
+            </a:r>
+            <a:r>
+              <a:rPr lang="en-US" dirty="0" err="1"/>
+              <a:t>EventHubProducerClient</a:t>
+            </a:r>
+            <a:r>
+              <a:rPr lang="en-US" dirty="0"/>
+              <a:t> from </a:t>
+            </a:r>
+            <a:r>
+              <a:rPr lang="en-US" dirty="0" err="1"/>
+              <a:t>Azure.Messaging.EventHubs</a:t>
+            </a:r>
+            <a:r>
+              <a:rPr lang="en-US" dirty="0"/>
+              <a:t> nugget package</a:t>
+            </a:r>
+          </a:p>
+          <a:p>
+            <a:pPr lvl="2"/>
+            <a:r>
+              <a:rPr lang="en-US" dirty="0"/>
+              <a:t>Requires </a:t>
+            </a:r>
+            <a:r>
+              <a:rPr lang="en-US" i="1" dirty="0"/>
+              <a:t>Shared Access Policy </a:t>
+            </a:r>
+            <a:r>
+              <a:rPr lang="en-US" dirty="0"/>
+              <a:t>connection string from received request hub</a:t>
+            </a:r>
+          </a:p>
+          <a:p>
+            <a:pPr lvl="1"/>
+            <a:r>
+              <a:rPr lang="en-US" dirty="0" smtClean="0"/>
+              <a:t>Business </a:t>
+            </a:r>
+            <a:r>
+              <a:rPr lang="en-US" dirty="0" smtClean="0"/>
+              <a:t>logic in </a:t>
             </a:r>
             <a:r>
               <a:rPr lang="en-US" dirty="0" err="1" smtClean="0"/>
@@ -12636,48 +12737,9 @@
               <a:rPr lang="en-US" dirty="0" smtClean="0"/>
               <a:t> project in solution</a:t>
             </a:r>
+          </a:p>
+          <a:p>
             <a:endParaRPr lang="en-US" dirty="0" smtClean="0"/>
-          </a:p>
-          <a:p>
-            <a:endParaRPr lang="en-US" dirty="0" smtClean="0"/>
-          </a:p>
-          <a:p>
-            <a:r>
-              <a:rPr lang="en-US" dirty="0" smtClean="0"/>
-              <a:t>Use </a:t>
-            </a:r>
-            <a:r>
-              <a:rPr lang="en-US" dirty="0" err="1" smtClean="0"/>
-              <a:t>EventHubProducerClient</a:t>
-            </a:r>
-            <a:r>
-              <a:rPr lang="en-US" dirty="0"/>
-              <a:t> from </a:t>
-            </a:r>
-            <a:r>
-              <a:rPr lang="en-US" dirty="0" err="1" smtClean="0"/>
-              <a:t>Azure.Messaging.EventHubs</a:t>
-            </a:r>
-            <a:r>
-              <a:rPr lang="en-US" dirty="0" smtClean="0"/>
-              <a:t> nugget package</a:t>
-            </a:r>
-          </a:p>
-          <a:p>
-            <a:pPr lvl="1"/>
-            <a:r>
-              <a:rPr lang="en-US" dirty="0" smtClean="0"/>
-              <a:t>Requires </a:t>
-            </a:r>
-            <a:r>
-              <a:rPr lang="en-US" i="1" dirty="0" smtClean="0"/>
-              <a:t>Shared Access Policy </a:t>
-            </a:r>
-            <a:r>
-              <a:rPr lang="en-US" dirty="0" smtClean="0"/>
-              <a:t>connection string from received request hub</a:t>
-            </a:r>
-            <a:endParaRPr lang="en-US" dirty="0"/>
           </a:p>
           <a:p>
             <a:endParaRPr lang="en-US" dirty="0" smtClean="0"/>
@@ -13089,11 +13151,7 @@
           <a:p>
             <a:r>
               <a:rPr lang="en-US" dirty="0" smtClean="0"/>
-              <a:t>sprint 1 </a:t>
-            </a:r>
-            <a:r>
-              <a:rPr lang="en-US" dirty="0" smtClean="0"/>
-              <a:t>retrospective</a:t>
+              <a:t>sprint 1 retrospective</a:t>
             </a:r>
             <a:endParaRPr lang="en-US" dirty="0"/>
           </a:p>
@@ -13131,81 +13189,43 @@
               <a:rPr lang="en-US" dirty="0" smtClean="0"/>
               <a:t>ncoming requests are available to any platform components</a:t>
             </a:r>
+          </a:p>
+          <a:p>
             <a:endParaRPr lang="en-US" dirty="0" smtClean="0"/>
           </a:p>
           <a:p>
+            <a:r>
+              <a:rPr lang="en-US" dirty="0" smtClean="0"/>
+              <a:t>We are taking advantage of asynchronous messaging</a:t>
+            </a:r>
+            <a:endParaRPr lang="en-US" dirty="0"/>
+          </a:p>
+          <a:p>
+            <a:pPr lvl="1"/>
+            <a:r>
+              <a:rPr lang="en-US" dirty="0" smtClean="0"/>
+              <a:t>Publishing requests with little concern for who will consume them or how many consumers there will be</a:t>
+            </a:r>
+            <a:endParaRPr lang="en-US" dirty="0"/>
+          </a:p>
+          <a:p>
             <a:endParaRPr lang="en-US" dirty="0" smtClean="0"/>
           </a:p>
           <a:p>
             <a:r>
               <a:rPr lang="en-US" dirty="0" smtClean="0"/>
-              <a:t>We are taking advantage of asynchronous </a:t>
-            </a:r>
-            <a:r>
-              <a:rPr lang="en-US" dirty="0" smtClean="0"/>
-              <a:t>messaging</a:t>
-            </a:r>
-            <a:endParaRPr lang="en-US" dirty="0"/>
+              <a:t>Everything about the platform is scalable</a:t>
+            </a:r>
           </a:p>
           <a:p>
             <a:pPr lvl="1"/>
-            <a:r>
-              <a:rPr lang="en-US" dirty="0" smtClean="0"/>
-              <a:t>Publish</a:t>
-            </a:r>
-            <a:r>
-              <a:rPr lang="en-US" dirty="0" smtClean="0"/>
-              <a:t>ing </a:t>
-            </a:r>
-            <a:r>
-              <a:rPr lang="en-US" dirty="0" smtClean="0"/>
-              <a:t>request</a:t>
-            </a:r>
-            <a:r>
-              <a:rPr lang="en-US" dirty="0" smtClean="0"/>
-              <a:t>s </a:t>
-            </a:r>
-            <a:r>
-              <a:rPr lang="en-US" dirty="0" smtClean="0"/>
-              <a:t>with little concern for who </a:t>
-            </a:r>
-            <a:r>
-              <a:rPr lang="en-US" dirty="0" smtClean="0"/>
-              <a:t>will consume them or how many consumers there will be</a:t>
-            </a:r>
-            <a:endParaRPr lang="en-US" dirty="0"/>
-          </a:p>
-          <a:p>
-            <a:endParaRPr lang="en-US" dirty="0" smtClean="0"/>
-          </a:p>
-          <a:p>
-            <a:r>
-              <a:rPr lang="en-US" dirty="0" smtClean="0"/>
-              <a:t>Everything about the platform is scalable</a:t>
-            </a:r>
-          </a:p>
-          <a:p>
-            <a:pPr lvl="1"/>
-            <a:endParaRPr lang="en-US" dirty="0"/>
-          </a:p>
-          <a:p>
-            <a:r>
-              <a:rPr lang="en-US" dirty="0" smtClean="0"/>
-              <a:t>Later exercises will </a:t>
-            </a:r>
-            <a:r>
-              <a:rPr lang="en-US" dirty="0" smtClean="0"/>
-              <a:t>demonstrate asynchronous </a:t>
-            </a:r>
-            <a:r>
-              <a:rPr lang="en-US" dirty="0" smtClean="0"/>
-              <a:t>messaging </a:t>
-            </a:r>
-            <a:r>
-              <a:rPr lang="en-US" dirty="0" smtClean="0"/>
-              <a:t>and scalability</a:t>
-            </a:r>
-            <a:endParaRPr lang="en-US" dirty="0" smtClean="0"/>
+            <a:endParaRPr lang="en-US" dirty="0"/>
+          </a:p>
+          <a:p>
+            <a:r>
+              <a:rPr lang="en-US" dirty="0" smtClean="0"/>
+              <a:t>Later exercises will demonstrate asynchronous messaging and scalability</a:t>
+            </a:r>
           </a:p>
         </p:txBody>
       </p:sp>
@@ -15015,11 +15035,7 @@
           <a:p>
             <a:r>
               <a:rPr lang="en-US" dirty="0" smtClean="0"/>
-              <a:t>Request </a:t>
-            </a:r>
-            <a:r>
-              <a:rPr lang="en-US" dirty="0" smtClean="0"/>
-              <a:t>/ response pattern</a:t>
+              <a:t>Request / response pattern</a:t>
             </a:r>
             <a:endParaRPr lang="en-US" dirty="0"/>
           </a:p>

</xml_diff>

<commit_message>
Added appostrophe to Amigo's
</commit_message>
<xml_diff>
--- a/EdaWorkshop.pptx
+++ b/EdaWorkshop.pptx
@@ -572,7 +572,7 @@
           <a:p>
             <a:fld id="{83284890-85D2-4D7B-8EF5-15A9C1DB8F42}" type="datetimeFigureOut">
               <a:rPr lang="en-US" dirty="0"/>
-              <a:t>8/5/2021</a:t>
+              <a:t>8/14/2021</a:t>
             </a:fld>
             <a:endParaRPr lang="en-US" dirty="0"/>
           </a:p>
@@ -747,7 +747,7 @@
           <a:p>
             <a:fld id="{87157CC2-0FC8-4686-B024-99790E0F5162}" type="datetimeFigureOut">
               <a:rPr lang="en-US" dirty="0"/>
-              <a:t>8/5/2021</a:t>
+              <a:t>8/14/2021</a:t>
             </a:fld>
             <a:endParaRPr lang="en-US" dirty="0"/>
           </a:p>
@@ -922,7 +922,7 @@
           <a:p>
             <a:fld id="{F6764DA5-CD3D-4590-A511-FCD3BC7A793E}" type="datetimeFigureOut">
               <a:rPr lang="en-US" dirty="0"/>
-              <a:t>8/5/2021</a:t>
+              <a:t>8/14/2021</a:t>
             </a:fld>
             <a:endParaRPr lang="en-US" dirty="0"/>
           </a:p>
@@ -1087,7 +1087,7 @@
           <a:p>
             <a:fld id="{82F5661D-6934-4B32-B92C-470368BF1EC6}" type="datetimeFigureOut">
               <a:rPr lang="en-US" dirty="0"/>
-              <a:t>8/5/2021</a:t>
+              <a:t>8/14/2021</a:t>
             </a:fld>
             <a:endParaRPr lang="en-US" dirty="0"/>
           </a:p>
@@ -1395,7 +1395,7 @@
           <a:p>
             <a:fld id="{C6F822A4-8DA6-4447-9B1F-C5DB58435268}" type="datetimeFigureOut">
               <a:rPr lang="en-US" dirty="0"/>
-              <a:t>8/5/2021</a:t>
+              <a:t>8/14/2021</a:t>
             </a:fld>
             <a:endParaRPr lang="en-US" dirty="0"/>
           </a:p>
@@ -1777,7 +1777,7 @@
           <a:p>
             <a:fld id="{E548D31E-DCDA-41A7-9C67-C4B11B94D21D}" type="datetimeFigureOut">
               <a:rPr lang="en-US" dirty="0"/>
-              <a:t>8/5/2021</a:t>
+              <a:t>8/14/2021</a:t>
             </a:fld>
             <a:endParaRPr lang="en-US" dirty="0"/>
           </a:p>
@@ -2206,7 +2206,7 @@
           <a:p>
             <a:fld id="{9B3762C0-B258-48F1-ADE6-176B4174CCDD}" type="datetimeFigureOut">
               <a:rPr lang="en-US" dirty="0"/>
-              <a:t>8/5/2021</a:t>
+              <a:t>8/14/2021</a:t>
             </a:fld>
             <a:endParaRPr lang="en-US" dirty="0"/>
           </a:p>
@@ -2319,7 +2319,7 @@
           <a:p>
             <a:fld id="{677919A6-33EB-49BD-A62F-1FA56B9F9712}" type="datetimeFigureOut">
               <a:rPr lang="en-US" dirty="0"/>
-              <a:t>8/5/2021</a:t>
+              <a:t>8/14/2021</a:t>
             </a:fld>
             <a:endParaRPr lang="en-US" dirty="0"/>
           </a:p>
@@ -2409,7 +2409,7 @@
           <a:p>
             <a:fld id="{CA4E7D1B-D673-4CF6-8672-009D42ABD2A0}" type="datetimeFigureOut">
               <a:rPr lang="en-US" dirty="0"/>
-              <a:t>8/5/2021</a:t>
+              <a:t>8/14/2021</a:t>
             </a:fld>
             <a:endParaRPr lang="en-US" dirty="0"/>
           </a:p>
@@ -2754,7 +2754,7 @@
           <a:p>
             <a:fld id="{DA16AA21-1863-4931-97CB-99D0A168701B}" type="datetimeFigureOut">
               <a:rPr lang="en-US" dirty="0"/>
-              <a:t>8/5/2021</a:t>
+              <a:t>8/14/2021</a:t>
             </a:fld>
             <a:endParaRPr lang="en-US" dirty="0"/>
           </a:p>
@@ -3174,7 +3174,7 @@
           <a:p>
             <a:fld id="{3772C379-9A7C-4C87-A116-CBE9F58B04C5}" type="datetimeFigureOut">
               <a:rPr lang="en-US" dirty="0"/>
-              <a:t>8/5/2021</a:t>
+              <a:t>8/14/2021</a:t>
             </a:fld>
             <a:endParaRPr lang="en-US" dirty="0"/>
           </a:p>
@@ -3450,7 +3450,7 @@
           <a:p>
             <a:fld id="{8664C608-40B1-4030-A28D-5B74BC98ADCE}" type="datetimeFigureOut">
               <a:rPr lang="en-US" dirty="0"/>
-              <a:t>8/5/2021</a:t>
+              <a:t>8/14/2021</a:t>
             </a:fld>
             <a:endParaRPr lang="en-US" dirty="0"/>
           </a:p>
@@ -4067,7 +4067,11 @@
           <a:p>
             <a:r>
               <a:rPr lang="en-US" dirty="0" smtClean="0"/>
-              <a:t>Three Amigos </a:t>
+              <a:t>Three </a:t>
+            </a:r>
+            <a:r>
+              <a:rPr lang="en-US" dirty="0" smtClean="0"/>
+              <a:t>Amigo’s </a:t>
             </a:r>
             <a:r>
               <a:rPr lang="en-US" dirty="0" smtClean="0"/>
@@ -17999,15 +18003,15 @@
             </a:pPr>
             <a:r>
               <a:rPr lang="en-US" dirty="0" smtClean="0"/>
-              <a:t>Three Amigos </a:t>
-            </a:r>
-            <a:r>
-              <a:rPr lang="en-US" dirty="0" smtClean="0"/>
-              <a:t>Health </a:t>
-            </a:r>
-            <a:r>
-              <a:rPr lang="en-US" dirty="0" smtClean="0"/>
-              <a:t>provides utilization management reviews for health care insurers. The insurers that employee TAH require providers to get approval before administering sleep studies, fertility treatments, or long-term care to their patients. This process helps ensure that the services are appropriate for the patient at the time.</a:t>
+              <a:t>Three </a:t>
+            </a:r>
+            <a:r>
+              <a:rPr lang="en-US" dirty="0" smtClean="0"/>
+              <a:t>Amigo’s </a:t>
+            </a:r>
+            <a:r>
+              <a:rPr lang="en-US" dirty="0" smtClean="0"/>
+              <a:t>Health provides utilization management reviews for health care insurers. The insurers that employee TAH require providers to get approval before administering sleep studies, fertility treatments, or long-term care to their patients. This process helps ensure that the services are appropriate for the patient at the time.</a:t>
             </a:r>
           </a:p>
           <a:p>

</xml_diff>